<commit_message>
Images, block diagram added, more text
</commit_message>
<xml_diff>
--- a/doc/proj_report/img/block_diag.pptx
+++ b/doc/proj_report/img/block_diag.pptx
@@ -3103,8 +3103,8 @@
         </p:nvSpPr>
         <p:spPr>
           <a:xfrm>
-            <a:off x="444500" y="469900"/>
-            <a:ext cx="1651000" cy="838200"/>
+            <a:off x="444500" y="469899"/>
+            <a:ext cx="1651000" cy="1288198"/>
           </a:xfrm>
           <a:prstGeom prst="rect">
             <a:avLst/>
@@ -3130,8 +3130,12 @@
           <a:p>
             <a:pPr algn="ctr"/>
             <a:r>
+              <a:rPr lang="en-US" dirty="0"/>
+              <a:t>a</a:t>
+            </a:r>
+            <a:r>
               <a:rPr lang="en-US" dirty="0" smtClean="0"/>
-              <a:t>Accelerometer</a:t>
+              <a:t>ccelerometer (hardware)</a:t>
             </a:r>
             <a:endParaRPr lang="en-US" dirty="0"/>
           </a:p>
@@ -3140,15 +3144,13 @@
       <p:cxnSp>
         <p:nvCxnSpPr>
           <p:cNvPr id="7" name="Straight Arrow Connector 6"/>
-          <p:cNvCxnSpPr>
-            <a:stCxn id="2" idx="3"/>
-          </p:cNvCxnSpPr>
+          <p:cNvCxnSpPr/>
           <p:nvPr/>
         </p:nvCxnSpPr>
         <p:spPr>
           <a:xfrm>
-            <a:off x="2095500" y="889000"/>
-            <a:ext cx="698500" cy="0"/>
+            <a:off x="2095500" y="693624"/>
+            <a:ext cx="881144" cy="0"/>
           </a:xfrm>
           <a:prstGeom prst="straightConnector1">
             <a:avLst/>
@@ -3174,14 +3176,1048 @@
       </p:cxnSp>
       <p:sp>
         <p:nvSpPr>
-          <p:cNvPr id="8" name="Rectangle 7"/>
+          <p:cNvPr id="5" name="Rectangle 4"/>
           <p:cNvSpPr/>
           <p:nvPr/>
         </p:nvSpPr>
         <p:spPr>
           <a:xfrm>
-            <a:off x="2794000" y="304800"/>
-            <a:ext cx="1727200" cy="1358900"/>
+            <a:off x="2976644" y="463571"/>
+            <a:ext cx="1361911" cy="519191"/>
+          </a:xfrm>
+          <a:prstGeom prst="rect">
+            <a:avLst/>
+          </a:prstGeom>
+        </p:spPr>
+        <p:style>
+          <a:lnRef idx="1">
+            <a:schemeClr val="accent1"/>
+          </a:lnRef>
+          <a:fillRef idx="3">
+            <a:schemeClr val="accent1"/>
+          </a:fillRef>
+          <a:effectRef idx="2">
+            <a:schemeClr val="accent1"/>
+          </a:effectRef>
+          <a:fontRef idx="minor">
+            <a:schemeClr val="lt1"/>
+          </a:fontRef>
+        </p:style>
+        <p:txBody>
+          <a:bodyPr rtlCol="0" anchor="ctr"/>
+          <a:lstStyle/>
+          <a:p>
+            <a:pPr algn="ctr"/>
+            <a:r>
+              <a:rPr lang="en-US" dirty="0" err="1" smtClean="0"/>
+              <a:t>ser_to_par</a:t>
+            </a:r>
+            <a:endParaRPr lang="en-US" dirty="0"/>
+          </a:p>
+        </p:txBody>
+      </p:sp>
+      <p:sp>
+        <p:nvSpPr>
+          <p:cNvPr id="13" name="TextBox 12"/>
+          <p:cNvSpPr txBox="1"/>
+          <p:nvPr/>
+        </p:nvSpPr>
+        <p:spPr>
+          <a:xfrm>
+            <a:off x="2095500" y="336431"/>
+            <a:ext cx="1123537" cy="646331"/>
+          </a:xfrm>
+          <a:prstGeom prst="rect">
+            <a:avLst/>
+          </a:prstGeom>
+          <a:noFill/>
+        </p:spPr>
+        <p:txBody>
+          <a:bodyPr wrap="square" rtlCol="0">
+            <a:spAutoFit/>
+          </a:bodyPr>
+          <a:lstStyle/>
+          <a:p>
+            <a:r>
+              <a:rPr lang="en-US" dirty="0" smtClean="0"/>
+              <a:t>serial stream</a:t>
+            </a:r>
+            <a:endParaRPr lang="en-US" dirty="0"/>
+          </a:p>
+        </p:txBody>
+      </p:sp>
+      <p:sp>
+        <p:nvSpPr>
+          <p:cNvPr id="35" name="Rectangle 34"/>
+          <p:cNvSpPr/>
+          <p:nvPr/>
+        </p:nvSpPr>
+        <p:spPr>
+          <a:xfrm>
+            <a:off x="2976644" y="1135162"/>
+            <a:ext cx="1361911" cy="519191"/>
+          </a:xfrm>
+          <a:prstGeom prst="rect">
+            <a:avLst/>
+          </a:prstGeom>
+        </p:spPr>
+        <p:style>
+          <a:lnRef idx="1">
+            <a:schemeClr val="accent1"/>
+          </a:lnRef>
+          <a:fillRef idx="3">
+            <a:schemeClr val="accent1"/>
+          </a:fillRef>
+          <a:effectRef idx="2">
+            <a:schemeClr val="accent1"/>
+          </a:effectRef>
+          <a:fontRef idx="minor">
+            <a:schemeClr val="lt1"/>
+          </a:fontRef>
+        </p:style>
+        <p:txBody>
+          <a:bodyPr rtlCol="0" anchor="ctr"/>
+          <a:lstStyle/>
+          <a:p>
+            <a:pPr algn="ctr"/>
+            <a:r>
+              <a:rPr lang="en-US" dirty="0" err="1" smtClean="0"/>
+              <a:t>par_to_ser</a:t>
+            </a:r>
+            <a:endParaRPr lang="en-US" dirty="0"/>
+          </a:p>
+        </p:txBody>
+      </p:sp>
+      <p:cxnSp>
+        <p:nvCxnSpPr>
+          <p:cNvPr id="18" name="Straight Arrow Connector 17"/>
+          <p:cNvCxnSpPr>
+            <a:stCxn id="35" idx="1"/>
+          </p:cNvCxnSpPr>
+          <p:nvPr/>
+        </p:nvCxnSpPr>
+        <p:spPr>
+          <a:xfrm flipH="1">
+            <a:off x="2095500" y="1394758"/>
+            <a:ext cx="881144" cy="0"/>
+          </a:xfrm>
+          <a:prstGeom prst="straightConnector1">
+            <a:avLst/>
+          </a:prstGeom>
+          <a:ln>
+            <a:tailEnd type="arrow"/>
+          </a:ln>
+        </p:spPr>
+        <p:style>
+          <a:lnRef idx="2">
+            <a:schemeClr val="accent1"/>
+          </a:lnRef>
+          <a:fillRef idx="0">
+            <a:schemeClr val="accent1"/>
+          </a:fillRef>
+          <a:effectRef idx="1">
+            <a:schemeClr val="accent1"/>
+          </a:effectRef>
+          <a:fontRef idx="minor">
+            <a:schemeClr val="tx1"/>
+          </a:fontRef>
+        </p:style>
+      </p:cxnSp>
+      <p:sp>
+        <p:nvSpPr>
+          <p:cNvPr id="38" name="TextBox 37"/>
+          <p:cNvSpPr txBox="1"/>
+          <p:nvPr/>
+        </p:nvSpPr>
+        <p:spPr>
+          <a:xfrm>
+            <a:off x="2180986" y="1071592"/>
+            <a:ext cx="1123537" cy="646331"/>
+          </a:xfrm>
+          <a:prstGeom prst="rect">
+            <a:avLst/>
+          </a:prstGeom>
+          <a:noFill/>
+        </p:spPr>
+        <p:txBody>
+          <a:bodyPr wrap="square" rtlCol="0">
+            <a:spAutoFit/>
+          </a:bodyPr>
+          <a:lstStyle/>
+          <a:p>
+            <a:r>
+              <a:rPr lang="en-US" dirty="0" smtClean="0"/>
+              <a:t>serial stream</a:t>
+            </a:r>
+            <a:endParaRPr lang="en-US" dirty="0"/>
+          </a:p>
+        </p:txBody>
+      </p:sp>
+      <p:sp>
+        <p:nvSpPr>
+          <p:cNvPr id="25" name="Rectangle 24"/>
+          <p:cNvSpPr/>
+          <p:nvPr/>
+        </p:nvSpPr>
+        <p:spPr>
+          <a:xfrm>
+            <a:off x="5243731" y="463571"/>
+            <a:ext cx="1502004" cy="1294526"/>
+          </a:xfrm>
+          <a:prstGeom prst="rect">
+            <a:avLst/>
+          </a:prstGeom>
+        </p:spPr>
+        <p:style>
+          <a:lnRef idx="1">
+            <a:schemeClr val="accent1"/>
+          </a:lnRef>
+          <a:fillRef idx="3">
+            <a:schemeClr val="accent1"/>
+          </a:fillRef>
+          <a:effectRef idx="2">
+            <a:schemeClr val="accent1"/>
+          </a:effectRef>
+          <a:fontRef idx="minor">
+            <a:schemeClr val="lt1"/>
+          </a:fontRef>
+        </p:style>
+        <p:txBody>
+          <a:bodyPr rtlCol="0" anchor="ctr"/>
+          <a:lstStyle/>
+          <a:p>
+            <a:pPr algn="ctr"/>
+            <a:r>
+              <a:rPr lang="en-US" dirty="0" err="1" smtClean="0"/>
+              <a:t>acc</a:t>
+            </a:r>
+            <a:r>
+              <a:rPr lang="en-US" dirty="0" smtClean="0"/>
+              <a:t> (including </a:t>
+            </a:r>
+            <a:r>
+              <a:rPr lang="en-US" dirty="0" err="1" smtClean="0"/>
+              <a:t>moving_avg</a:t>
+            </a:r>
+            <a:r>
+              <a:rPr lang="en-US" dirty="0" smtClean="0"/>
+              <a:t>)</a:t>
+            </a:r>
+            <a:endParaRPr lang="en-US" dirty="0"/>
+          </a:p>
+        </p:txBody>
+      </p:sp>
+      <p:cxnSp>
+        <p:nvCxnSpPr>
+          <p:cNvPr id="30" name="Straight Arrow Connector 29"/>
+          <p:cNvCxnSpPr/>
+          <p:nvPr/>
+        </p:nvCxnSpPr>
+        <p:spPr>
+          <a:xfrm flipH="1">
+            <a:off x="4338555" y="1392355"/>
+            <a:ext cx="887631" cy="0"/>
+          </a:xfrm>
+          <a:prstGeom prst="straightConnector1">
+            <a:avLst/>
+          </a:prstGeom>
+          <a:ln>
+            <a:tailEnd type="arrow"/>
+          </a:ln>
+        </p:spPr>
+        <p:style>
+          <a:lnRef idx="2">
+            <a:schemeClr val="accent1"/>
+          </a:lnRef>
+          <a:fillRef idx="0">
+            <a:schemeClr val="accent1"/>
+          </a:fillRef>
+          <a:effectRef idx="1">
+            <a:schemeClr val="accent1"/>
+          </a:effectRef>
+          <a:fontRef idx="minor">
+            <a:schemeClr val="tx1"/>
+          </a:fontRef>
+        </p:style>
+      </p:cxnSp>
+      <p:cxnSp>
+        <p:nvCxnSpPr>
+          <p:cNvPr id="33" name="Straight Arrow Connector 32"/>
+          <p:cNvCxnSpPr>
+            <a:stCxn id="5" idx="3"/>
+          </p:cNvCxnSpPr>
+          <p:nvPr/>
+        </p:nvCxnSpPr>
+        <p:spPr>
+          <a:xfrm>
+            <a:off x="4338555" y="723167"/>
+            <a:ext cx="905176" cy="0"/>
+          </a:xfrm>
+          <a:prstGeom prst="straightConnector1">
+            <a:avLst/>
+          </a:prstGeom>
+          <a:ln>
+            <a:tailEnd type="arrow"/>
+          </a:ln>
+        </p:spPr>
+        <p:style>
+          <a:lnRef idx="2">
+            <a:schemeClr val="accent1"/>
+          </a:lnRef>
+          <a:fillRef idx="0">
+            <a:schemeClr val="accent1"/>
+          </a:fillRef>
+          <a:effectRef idx="1">
+            <a:schemeClr val="accent1"/>
+          </a:effectRef>
+          <a:fontRef idx="minor">
+            <a:schemeClr val="tx1"/>
+          </a:fontRef>
+        </p:style>
+      </p:cxnSp>
+      <p:sp>
+        <p:nvSpPr>
+          <p:cNvPr id="47" name="TextBox 46"/>
+          <p:cNvSpPr txBox="1"/>
+          <p:nvPr/>
+        </p:nvSpPr>
+        <p:spPr>
+          <a:xfrm>
+            <a:off x="4356100" y="370458"/>
+            <a:ext cx="1123537" cy="646331"/>
+          </a:xfrm>
+          <a:prstGeom prst="rect">
+            <a:avLst/>
+          </a:prstGeom>
+          <a:noFill/>
+        </p:spPr>
+        <p:txBody>
+          <a:bodyPr wrap="square" rtlCol="0">
+            <a:spAutoFit/>
+          </a:bodyPr>
+          <a:lstStyle/>
+          <a:p>
+            <a:r>
+              <a:rPr lang="en-US" dirty="0" smtClean="0"/>
+              <a:t>parallel</a:t>
+            </a:r>
+          </a:p>
+          <a:p>
+            <a:r>
+              <a:rPr lang="en-US" dirty="0" smtClean="0"/>
+              <a:t>word</a:t>
+            </a:r>
+            <a:endParaRPr lang="en-US" dirty="0"/>
+          </a:p>
+        </p:txBody>
+      </p:sp>
+      <p:sp>
+        <p:nvSpPr>
+          <p:cNvPr id="50" name="TextBox 49"/>
+          <p:cNvSpPr txBox="1"/>
+          <p:nvPr/>
+        </p:nvSpPr>
+        <p:spPr>
+          <a:xfrm>
+            <a:off x="4356100" y="1016789"/>
+            <a:ext cx="1123537" cy="646331"/>
+          </a:xfrm>
+          <a:prstGeom prst="rect">
+            <a:avLst/>
+          </a:prstGeom>
+          <a:noFill/>
+        </p:spPr>
+        <p:txBody>
+          <a:bodyPr wrap="square" rtlCol="0">
+            <a:spAutoFit/>
+          </a:bodyPr>
+          <a:lstStyle/>
+          <a:p>
+            <a:r>
+              <a:rPr lang="en-US" dirty="0" smtClean="0"/>
+              <a:t>parallel</a:t>
+            </a:r>
+          </a:p>
+          <a:p>
+            <a:r>
+              <a:rPr lang="en-US" dirty="0" smtClean="0"/>
+              <a:t>word</a:t>
+            </a:r>
+            <a:endParaRPr lang="en-US" dirty="0"/>
+          </a:p>
+        </p:txBody>
+      </p:sp>
+      <p:cxnSp>
+        <p:nvCxnSpPr>
+          <p:cNvPr id="45" name="Straight Arrow Connector 44"/>
+          <p:cNvCxnSpPr>
+            <a:stCxn id="25" idx="3"/>
+          </p:cNvCxnSpPr>
+          <p:nvPr/>
+        </p:nvCxnSpPr>
+        <p:spPr>
+          <a:xfrm>
+            <a:off x="6745735" y="1110834"/>
+            <a:ext cx="948048" cy="0"/>
+          </a:xfrm>
+          <a:prstGeom prst="straightConnector1">
+            <a:avLst/>
+          </a:prstGeom>
+          <a:ln>
+            <a:tailEnd type="arrow"/>
+          </a:ln>
+        </p:spPr>
+        <p:style>
+          <a:lnRef idx="2">
+            <a:schemeClr val="accent1"/>
+          </a:lnRef>
+          <a:fillRef idx="0">
+            <a:schemeClr val="accent1"/>
+          </a:fillRef>
+          <a:effectRef idx="1">
+            <a:schemeClr val="accent1"/>
+          </a:effectRef>
+          <a:fontRef idx="minor">
+            <a:schemeClr val="tx1"/>
+          </a:fontRef>
+        </p:style>
+      </p:cxnSp>
+      <p:sp>
+        <p:nvSpPr>
+          <p:cNvPr id="56" name="TextBox 55"/>
+          <p:cNvSpPr txBox="1"/>
+          <p:nvPr/>
+        </p:nvSpPr>
+        <p:spPr>
+          <a:xfrm>
+            <a:off x="6851131" y="746024"/>
+            <a:ext cx="671679" cy="646331"/>
+          </a:xfrm>
+          <a:prstGeom prst="rect">
+            <a:avLst/>
+          </a:prstGeom>
+          <a:noFill/>
+        </p:spPr>
+        <p:txBody>
+          <a:bodyPr wrap="square" rtlCol="0">
+            <a:spAutoFit/>
+          </a:bodyPr>
+          <a:lstStyle/>
+          <a:p>
+            <a:r>
+              <a:rPr lang="en-US" dirty="0" smtClean="0"/>
+              <a:t>x &amp; y</a:t>
+            </a:r>
+          </a:p>
+          <a:p>
+            <a:r>
+              <a:rPr lang="en-US" dirty="0" smtClean="0"/>
+              <a:t>acc.</a:t>
+            </a:r>
+            <a:endParaRPr lang="en-US" dirty="0"/>
+          </a:p>
+        </p:txBody>
+      </p:sp>
+      <p:sp>
+        <p:nvSpPr>
+          <p:cNvPr id="57" name="Rectangle 56"/>
+          <p:cNvSpPr/>
+          <p:nvPr/>
+        </p:nvSpPr>
+        <p:spPr>
+          <a:xfrm>
+            <a:off x="7693783" y="573918"/>
+            <a:ext cx="1306722" cy="696026"/>
+          </a:xfrm>
+          <a:prstGeom prst="rect">
+            <a:avLst/>
+          </a:prstGeom>
+        </p:spPr>
+        <p:style>
+          <a:lnRef idx="1">
+            <a:schemeClr val="accent1"/>
+          </a:lnRef>
+          <a:fillRef idx="3">
+            <a:schemeClr val="accent1"/>
+          </a:fillRef>
+          <a:effectRef idx="2">
+            <a:schemeClr val="accent1"/>
+          </a:effectRef>
+          <a:fontRef idx="minor">
+            <a:schemeClr val="lt1"/>
+          </a:fontRef>
+        </p:style>
+        <p:txBody>
+          <a:bodyPr rtlCol="0" anchor="ctr"/>
+          <a:lstStyle/>
+          <a:p>
+            <a:pPr algn="ctr"/>
+            <a:r>
+              <a:rPr lang="en-US" dirty="0" err="1" smtClean="0"/>
+              <a:t>accel_lut</a:t>
+            </a:r>
+            <a:endParaRPr lang="en-US" dirty="0"/>
+          </a:p>
+        </p:txBody>
+      </p:sp>
+      <p:cxnSp>
+        <p:nvCxnSpPr>
+          <p:cNvPr id="59" name="Straight Arrow Connector 58"/>
+          <p:cNvCxnSpPr>
+            <a:stCxn id="57" idx="2"/>
+          </p:cNvCxnSpPr>
+          <p:nvPr/>
+        </p:nvCxnSpPr>
+        <p:spPr>
+          <a:xfrm flipH="1">
+            <a:off x="8341038" y="1269944"/>
+            <a:ext cx="6106" cy="854769"/>
+          </a:xfrm>
+          <a:prstGeom prst="straightConnector1">
+            <a:avLst/>
+          </a:prstGeom>
+          <a:ln>
+            <a:tailEnd type="arrow"/>
+          </a:ln>
+        </p:spPr>
+        <p:style>
+          <a:lnRef idx="2">
+            <a:schemeClr val="accent1"/>
+          </a:lnRef>
+          <a:fillRef idx="0">
+            <a:schemeClr val="accent1"/>
+          </a:fillRef>
+          <a:effectRef idx="1">
+            <a:schemeClr val="accent1"/>
+          </a:effectRef>
+          <a:fontRef idx="minor">
+            <a:schemeClr val="tx1"/>
+          </a:fontRef>
+        </p:style>
+      </p:cxnSp>
+      <p:sp>
+        <p:nvSpPr>
+          <p:cNvPr id="60" name="TextBox 59"/>
+          <p:cNvSpPr txBox="1"/>
+          <p:nvPr/>
+        </p:nvSpPr>
+        <p:spPr>
+          <a:xfrm>
+            <a:off x="7693783" y="1281869"/>
+            <a:ext cx="1450217" cy="646331"/>
+          </a:xfrm>
+          <a:prstGeom prst="rect">
+            <a:avLst/>
+          </a:prstGeom>
+          <a:noFill/>
+        </p:spPr>
+        <p:txBody>
+          <a:bodyPr wrap="square" rtlCol="0">
+            <a:spAutoFit/>
+          </a:bodyPr>
+          <a:lstStyle/>
+          <a:p>
+            <a:r>
+              <a:rPr lang="en-US" dirty="0" smtClean="0"/>
+              <a:t>quadrilateral</a:t>
+            </a:r>
+          </a:p>
+          <a:p>
+            <a:r>
+              <a:rPr lang="en-US" dirty="0" smtClean="0"/>
+              <a:t>corners</a:t>
+            </a:r>
+            <a:endParaRPr lang="en-US" dirty="0"/>
+          </a:p>
+        </p:txBody>
+      </p:sp>
+      <p:sp>
+        <p:nvSpPr>
+          <p:cNvPr id="62" name="Rectangle 61"/>
+          <p:cNvSpPr/>
+          <p:nvPr/>
+        </p:nvSpPr>
+        <p:spPr>
+          <a:xfrm>
+            <a:off x="7687677" y="2149135"/>
+            <a:ext cx="1306722" cy="659394"/>
+          </a:xfrm>
+          <a:prstGeom prst="rect">
+            <a:avLst/>
+          </a:prstGeom>
+        </p:spPr>
+        <p:style>
+          <a:lnRef idx="1">
+            <a:schemeClr val="accent1"/>
+          </a:lnRef>
+          <a:fillRef idx="3">
+            <a:schemeClr val="accent1"/>
+          </a:fillRef>
+          <a:effectRef idx="2">
+            <a:schemeClr val="accent1"/>
+          </a:effectRef>
+          <a:fontRef idx="minor">
+            <a:schemeClr val="lt1"/>
+          </a:fontRef>
+        </p:style>
+        <p:txBody>
+          <a:bodyPr rtlCol="0" anchor="ctr"/>
+          <a:lstStyle/>
+          <a:p>
+            <a:pPr algn="ctr"/>
+            <a:r>
+              <a:rPr lang="en-US" dirty="0" err="1" smtClean="0"/>
+              <a:t>pixels_lost</a:t>
+            </a:r>
+            <a:endParaRPr lang="en-US" dirty="0"/>
+          </a:p>
+        </p:txBody>
+      </p:sp>
+      <p:cxnSp>
+        <p:nvCxnSpPr>
+          <p:cNvPr id="67" name="Straight Arrow Connector 66"/>
+          <p:cNvCxnSpPr/>
+          <p:nvPr/>
+        </p:nvCxnSpPr>
+        <p:spPr>
+          <a:xfrm>
+            <a:off x="8334932" y="2808529"/>
+            <a:ext cx="12212" cy="1789336"/>
+          </a:xfrm>
+          <a:prstGeom prst="straightConnector1">
+            <a:avLst/>
+          </a:prstGeom>
+          <a:ln>
+            <a:tailEnd type="arrow"/>
+          </a:ln>
+        </p:spPr>
+        <p:style>
+          <a:lnRef idx="2">
+            <a:schemeClr val="accent1"/>
+          </a:lnRef>
+          <a:fillRef idx="0">
+            <a:schemeClr val="accent1"/>
+          </a:fillRef>
+          <a:effectRef idx="1">
+            <a:schemeClr val="accent1"/>
+          </a:effectRef>
+          <a:fontRef idx="minor">
+            <a:schemeClr val="tx1"/>
+          </a:fontRef>
+        </p:style>
+      </p:cxnSp>
+      <p:sp>
+        <p:nvSpPr>
+          <p:cNvPr id="72" name="Rectangle 71"/>
+          <p:cNvSpPr/>
+          <p:nvPr/>
+        </p:nvSpPr>
+        <p:spPr>
+          <a:xfrm>
+            <a:off x="7438917" y="4597865"/>
+            <a:ext cx="1581500" cy="647182"/>
+          </a:xfrm>
+          <a:prstGeom prst="rect">
+            <a:avLst/>
+          </a:prstGeom>
+        </p:spPr>
+        <p:style>
+          <a:lnRef idx="1">
+            <a:schemeClr val="accent1"/>
+          </a:lnRef>
+          <a:fillRef idx="3">
+            <a:schemeClr val="accent1"/>
+          </a:fillRef>
+          <a:effectRef idx="2">
+            <a:schemeClr val="accent1"/>
+          </a:effectRef>
+          <a:fontRef idx="minor">
+            <a:schemeClr val="lt1"/>
+          </a:fontRef>
+        </p:style>
+        <p:txBody>
+          <a:bodyPr rtlCol="0" anchor="ctr"/>
+          <a:lstStyle/>
+          <a:p>
+            <a:pPr algn="ctr"/>
+            <a:r>
+              <a:rPr lang="en-US" dirty="0" err="1" smtClean="0"/>
+              <a:t>audioManager</a:t>
+            </a:r>
+            <a:endParaRPr lang="en-US" dirty="0"/>
+          </a:p>
+        </p:txBody>
+      </p:sp>
+      <p:sp>
+        <p:nvSpPr>
+          <p:cNvPr id="73" name="Rectangle 72"/>
+          <p:cNvSpPr/>
+          <p:nvPr/>
+        </p:nvSpPr>
+        <p:spPr>
+          <a:xfrm>
+            <a:off x="7438917" y="5916652"/>
+            <a:ext cx="1581499" cy="573917"/>
+          </a:xfrm>
+          <a:prstGeom prst="rect">
+            <a:avLst/>
+          </a:prstGeom>
+        </p:spPr>
+        <p:style>
+          <a:lnRef idx="1">
+            <a:schemeClr val="accent1"/>
+          </a:lnRef>
+          <a:fillRef idx="3">
+            <a:schemeClr val="accent1"/>
+          </a:fillRef>
+          <a:effectRef idx="2">
+            <a:schemeClr val="accent1"/>
+          </a:effectRef>
+          <a:fontRef idx="minor">
+            <a:schemeClr val="lt1"/>
+          </a:fontRef>
+        </p:style>
+        <p:txBody>
+          <a:bodyPr rtlCol="0" anchor="ctr"/>
+          <a:lstStyle/>
+          <a:p>
+            <a:pPr algn="ctr"/>
+            <a:r>
+              <a:rPr lang="en-US" dirty="0" smtClean="0"/>
+              <a:t>ac97 interface</a:t>
+            </a:r>
+            <a:endParaRPr lang="en-US" dirty="0"/>
+          </a:p>
+        </p:txBody>
+      </p:sp>
+      <p:cxnSp>
+        <p:nvCxnSpPr>
+          <p:cNvPr id="75" name="Straight Arrow Connector 74"/>
+          <p:cNvCxnSpPr/>
+          <p:nvPr/>
+        </p:nvCxnSpPr>
+        <p:spPr>
+          <a:xfrm>
+            <a:off x="8367055" y="5245047"/>
+            <a:ext cx="6106" cy="671605"/>
+          </a:xfrm>
+          <a:prstGeom prst="straightConnector1">
+            <a:avLst/>
+          </a:prstGeom>
+          <a:ln>
+            <a:tailEnd type="arrow"/>
+          </a:ln>
+        </p:spPr>
+        <p:style>
+          <a:lnRef idx="2">
+            <a:schemeClr val="accent1"/>
+          </a:lnRef>
+          <a:fillRef idx="0">
+            <a:schemeClr val="accent1"/>
+          </a:fillRef>
+          <a:effectRef idx="1">
+            <a:schemeClr val="accent1"/>
+          </a:effectRef>
+          <a:fontRef idx="minor">
+            <a:schemeClr val="tx1"/>
+          </a:fontRef>
+        </p:style>
+      </p:cxnSp>
+      <p:sp>
+        <p:nvSpPr>
+          <p:cNvPr id="76" name="Rectangle 75"/>
+          <p:cNvSpPr/>
+          <p:nvPr/>
+        </p:nvSpPr>
+        <p:spPr>
+          <a:xfrm>
+            <a:off x="5013287" y="4561232"/>
+            <a:ext cx="1387577" cy="683815"/>
+          </a:xfrm>
+          <a:prstGeom prst="rect">
+            <a:avLst/>
+          </a:prstGeom>
+        </p:spPr>
+        <p:style>
+          <a:lnRef idx="1">
+            <a:schemeClr val="accent1"/>
+          </a:lnRef>
+          <a:fillRef idx="3">
+            <a:schemeClr val="accent1"/>
+          </a:fillRef>
+          <a:effectRef idx="2">
+            <a:schemeClr val="accent1"/>
+          </a:effectRef>
+          <a:fontRef idx="minor">
+            <a:schemeClr val="lt1"/>
+          </a:fontRef>
+        </p:style>
+        <p:txBody>
+          <a:bodyPr rtlCol="0" anchor="ctr"/>
+          <a:lstStyle/>
+          <a:p>
+            <a:pPr algn="ctr"/>
+            <a:r>
+              <a:rPr lang="en-US" dirty="0" smtClean="0"/>
+              <a:t>pre-written flash</a:t>
+            </a:r>
+            <a:endParaRPr lang="en-US" dirty="0"/>
+          </a:p>
+        </p:txBody>
+      </p:sp>
+      <p:cxnSp>
+        <p:nvCxnSpPr>
+          <p:cNvPr id="78" name="Straight Arrow Connector 77"/>
+          <p:cNvCxnSpPr>
+            <a:stCxn id="76" idx="3"/>
+            <a:endCxn id="72" idx="1"/>
+          </p:cNvCxnSpPr>
+          <p:nvPr/>
+        </p:nvCxnSpPr>
+        <p:spPr>
+          <a:xfrm>
+            <a:off x="6400864" y="4903140"/>
+            <a:ext cx="1038053" cy="18316"/>
+          </a:xfrm>
+          <a:prstGeom prst="straightConnector1">
+            <a:avLst/>
+          </a:prstGeom>
+          <a:ln>
+            <a:tailEnd type="arrow"/>
+          </a:ln>
+        </p:spPr>
+        <p:style>
+          <a:lnRef idx="2">
+            <a:schemeClr val="accent1"/>
+          </a:lnRef>
+          <a:fillRef idx="0">
+            <a:schemeClr val="accent1"/>
+          </a:fillRef>
+          <a:effectRef idx="1">
+            <a:schemeClr val="accent1"/>
+          </a:effectRef>
+          <a:fontRef idx="minor">
+            <a:schemeClr val="tx1"/>
+          </a:fontRef>
+        </p:style>
+      </p:cxnSp>
+      <p:sp>
+        <p:nvSpPr>
+          <p:cNvPr id="79" name="TextBox 78"/>
+          <p:cNvSpPr txBox="1"/>
+          <p:nvPr/>
+        </p:nvSpPr>
+        <p:spPr>
+          <a:xfrm>
+            <a:off x="6478654" y="4561232"/>
+            <a:ext cx="744954" cy="646331"/>
+          </a:xfrm>
+          <a:prstGeom prst="rect">
+            <a:avLst/>
+          </a:prstGeom>
+          <a:noFill/>
+        </p:spPr>
+        <p:txBody>
+          <a:bodyPr wrap="square" rtlCol="0">
+            <a:spAutoFit/>
+          </a:bodyPr>
+          <a:lstStyle/>
+          <a:p>
+            <a:r>
+              <a:rPr lang="en-US" dirty="0" smtClean="0"/>
+              <a:t>audio</a:t>
+            </a:r>
+          </a:p>
+          <a:p>
+            <a:r>
+              <a:rPr lang="en-US" dirty="0" smtClean="0"/>
+              <a:t>data</a:t>
+            </a:r>
+            <a:endParaRPr lang="en-US" dirty="0"/>
+          </a:p>
+        </p:txBody>
+      </p:sp>
+      <p:sp>
+        <p:nvSpPr>
+          <p:cNvPr id="80" name="TextBox 79"/>
+          <p:cNvSpPr txBox="1"/>
+          <p:nvPr/>
+        </p:nvSpPr>
+        <p:spPr>
+          <a:xfrm>
+            <a:off x="8086171" y="5195352"/>
+            <a:ext cx="744954" cy="646331"/>
+          </a:xfrm>
+          <a:prstGeom prst="rect">
+            <a:avLst/>
+          </a:prstGeom>
+          <a:noFill/>
+        </p:spPr>
+        <p:txBody>
+          <a:bodyPr wrap="square" rtlCol="0">
+            <a:spAutoFit/>
+          </a:bodyPr>
+          <a:lstStyle/>
+          <a:p>
+            <a:r>
+              <a:rPr lang="en-US" dirty="0" smtClean="0"/>
+              <a:t>audio</a:t>
+            </a:r>
+          </a:p>
+          <a:p>
+            <a:r>
+              <a:rPr lang="en-US" dirty="0" smtClean="0"/>
+              <a:t>data</a:t>
+            </a:r>
+            <a:endParaRPr lang="en-US" dirty="0"/>
+          </a:p>
+        </p:txBody>
+      </p:sp>
+      <p:sp>
+        <p:nvSpPr>
+          <p:cNvPr id="83" name="TextBox 82"/>
+          <p:cNvSpPr txBox="1"/>
+          <p:nvPr/>
+        </p:nvSpPr>
+        <p:spPr>
+          <a:xfrm>
+            <a:off x="7644999" y="3515063"/>
+            <a:ext cx="1456323" cy="369332"/>
+          </a:xfrm>
+          <a:prstGeom prst="rect">
+            <a:avLst/>
+          </a:prstGeom>
+          <a:noFill/>
+        </p:spPr>
+        <p:txBody>
+          <a:bodyPr wrap="square" rtlCol="0">
+            <a:spAutoFit/>
+          </a:bodyPr>
+          <a:lstStyle/>
+          <a:p>
+            <a:r>
+              <a:rPr lang="en-US" dirty="0" smtClean="0"/>
+              <a:t>% pixels lost</a:t>
+            </a:r>
+            <a:endParaRPr lang="en-US" dirty="0"/>
+          </a:p>
+        </p:txBody>
+      </p:sp>
+      <p:cxnSp>
+        <p:nvCxnSpPr>
+          <p:cNvPr id="85" name="Straight Connector 84"/>
+          <p:cNvCxnSpPr/>
+          <p:nvPr/>
+        </p:nvCxnSpPr>
+        <p:spPr>
+          <a:xfrm flipH="1">
+            <a:off x="6745735" y="1928200"/>
+            <a:ext cx="1589198" cy="568"/>
+          </a:xfrm>
+          <a:prstGeom prst="line">
+            <a:avLst/>
+          </a:prstGeom>
+        </p:spPr>
+        <p:style>
+          <a:lnRef idx="2">
+            <a:schemeClr val="accent1"/>
+          </a:lnRef>
+          <a:fillRef idx="0">
+            <a:schemeClr val="accent1"/>
+          </a:fillRef>
+          <a:effectRef idx="1">
+            <a:schemeClr val="accent1"/>
+          </a:effectRef>
+          <a:fontRef idx="minor">
+            <a:schemeClr val="tx1"/>
+          </a:fontRef>
+        </p:style>
+      </p:cxnSp>
+      <p:cxnSp>
+        <p:nvCxnSpPr>
+          <p:cNvPr id="88" name="Straight Arrow Connector 87"/>
+          <p:cNvCxnSpPr/>
+          <p:nvPr/>
+        </p:nvCxnSpPr>
+        <p:spPr>
+          <a:xfrm>
+            <a:off x="6745735" y="1928768"/>
+            <a:ext cx="0" cy="440733"/>
+          </a:xfrm>
+          <a:prstGeom prst="straightConnector1">
+            <a:avLst/>
+          </a:prstGeom>
+          <a:ln>
+            <a:tailEnd type="arrow"/>
+          </a:ln>
+        </p:spPr>
+        <p:style>
+          <a:lnRef idx="2">
+            <a:schemeClr val="accent1"/>
+          </a:lnRef>
+          <a:fillRef idx="0">
+            <a:schemeClr val="accent1"/>
+          </a:fillRef>
+          <a:effectRef idx="1">
+            <a:schemeClr val="accent1"/>
+          </a:effectRef>
+          <a:fontRef idx="minor">
+            <a:schemeClr val="tx1"/>
+          </a:fontRef>
+        </p:style>
+      </p:cxnSp>
+      <p:sp>
+        <p:nvSpPr>
+          <p:cNvPr id="90" name="Rectangle 89"/>
+          <p:cNvSpPr/>
+          <p:nvPr/>
+        </p:nvSpPr>
+        <p:spPr>
+          <a:xfrm>
+            <a:off x="5243731" y="2369501"/>
+            <a:ext cx="2169169" cy="524505"/>
+          </a:xfrm>
+          <a:prstGeom prst="rect">
+            <a:avLst/>
+          </a:prstGeom>
+        </p:spPr>
+        <p:style>
+          <a:lnRef idx="1">
+            <a:schemeClr val="accent1"/>
+          </a:lnRef>
+          <a:fillRef idx="3">
+            <a:schemeClr val="accent1"/>
+          </a:fillRef>
+          <a:effectRef idx="2">
+            <a:schemeClr val="accent1"/>
+          </a:effectRef>
+          <a:fontRef idx="minor">
+            <a:schemeClr val="lt1"/>
+          </a:fontRef>
+        </p:style>
+        <p:txBody>
+          <a:bodyPr rtlCol="0" anchor="ctr"/>
+          <a:lstStyle/>
+          <a:p>
+            <a:pPr algn="ctr"/>
+            <a:r>
+              <a:rPr lang="en-US" dirty="0" err="1" smtClean="0"/>
+              <a:t>perspective_params</a:t>
+            </a:r>
+            <a:endParaRPr lang="en-US" dirty="0"/>
+          </a:p>
+        </p:txBody>
+      </p:sp>
+      <p:sp>
+        <p:nvSpPr>
+          <p:cNvPr id="91" name="Rectangle 90"/>
+          <p:cNvSpPr/>
+          <p:nvPr/>
+        </p:nvSpPr>
+        <p:spPr>
+          <a:xfrm>
+            <a:off x="236890" y="1928200"/>
+            <a:ext cx="1651000" cy="653226"/>
           </a:xfrm>
           <a:prstGeom prst="rect">
             <a:avLst/>
@@ -3208,7 +4244,49 @@
             <a:pPr algn="ctr"/>
             <a:r>
               <a:rPr lang="en-US" dirty="0" smtClean="0"/>
-              <a:t>Tilt Angle Estimation Engine (FSM)</a:t>
+              <a:t>NTSC camera</a:t>
+            </a:r>
+            <a:endParaRPr lang="en-US" dirty="0"/>
+          </a:p>
+        </p:txBody>
+      </p:sp>
+      <p:sp>
+        <p:nvSpPr>
+          <p:cNvPr id="92" name="Rectangle 91"/>
+          <p:cNvSpPr/>
+          <p:nvPr/>
+        </p:nvSpPr>
+        <p:spPr>
+          <a:xfrm>
+            <a:off x="236890" y="2950758"/>
+            <a:ext cx="1651000" cy="519191"/>
+          </a:xfrm>
+          <a:prstGeom prst="rect">
+            <a:avLst/>
+          </a:prstGeom>
+        </p:spPr>
+        <p:style>
+          <a:lnRef idx="1">
+            <a:schemeClr val="accent1"/>
+          </a:lnRef>
+          <a:fillRef idx="3">
+            <a:schemeClr val="accent1"/>
+          </a:fillRef>
+          <a:effectRef idx="2">
+            <a:schemeClr val="accent1"/>
+          </a:effectRef>
+          <a:fontRef idx="minor">
+            <a:schemeClr val="lt1"/>
+          </a:fontRef>
+        </p:style>
+        <p:txBody>
+          <a:bodyPr rtlCol="0" anchor="ctr"/>
+          <a:lstStyle/>
+          <a:p>
+            <a:pPr algn="ctr"/>
+            <a:r>
+              <a:rPr lang="en-US" dirty="0" err="1" smtClean="0"/>
+              <a:t>ntsc_to_bram</a:t>
             </a:r>
             <a:endParaRPr lang="en-US" dirty="0"/>
           </a:p>
@@ -3216,14 +4294,17 @@
       </p:sp>
       <p:cxnSp>
         <p:nvCxnSpPr>
-          <p:cNvPr id="10" name="Straight Arrow Connector 9"/>
-          <p:cNvCxnSpPr/>
+          <p:cNvPr id="96" name="Straight Arrow Connector 95"/>
+          <p:cNvCxnSpPr>
+            <a:stCxn id="91" idx="2"/>
+            <a:endCxn id="92" idx="0"/>
+          </p:cNvCxnSpPr>
           <p:nvPr/>
         </p:nvCxnSpPr>
         <p:spPr>
-          <a:xfrm flipV="1">
-            <a:off x="901700" y="1549400"/>
-            <a:ext cx="1892300" cy="12700"/>
+          <a:xfrm>
+            <a:off x="1062390" y="2581426"/>
+            <a:ext cx="0" cy="369332"/>
           </a:xfrm>
           <a:prstGeom prst="straightConnector1">
             <a:avLst/>
@@ -3249,14 +4330,91 @@
       </p:cxnSp>
       <p:sp>
         <p:nvSpPr>
-          <p:cNvPr id="11" name="TextBox 10"/>
+          <p:cNvPr id="97" name="Rectangle 96"/>
+          <p:cNvSpPr/>
+          <p:nvPr/>
+        </p:nvSpPr>
+        <p:spPr>
+          <a:xfrm>
+            <a:off x="5013287" y="3663298"/>
+            <a:ext cx="1732448" cy="647183"/>
+          </a:xfrm>
+          <a:prstGeom prst="rect">
+            <a:avLst/>
+          </a:prstGeom>
+        </p:spPr>
+        <p:style>
+          <a:lnRef idx="1">
+            <a:schemeClr val="accent1"/>
+          </a:lnRef>
+          <a:fillRef idx="3">
+            <a:schemeClr val="accent1"/>
+          </a:fillRef>
+          <a:effectRef idx="2">
+            <a:schemeClr val="accent1"/>
+          </a:effectRef>
+          <a:fontRef idx="minor">
+            <a:schemeClr val="lt1"/>
+          </a:fontRef>
+        </p:style>
+        <p:txBody>
+          <a:bodyPr rtlCol="0" anchor="ctr"/>
+          <a:lstStyle/>
+          <a:p>
+            <a:pPr algn="ctr"/>
+            <a:r>
+              <a:rPr lang="en-US" dirty="0" err="1" smtClean="0"/>
+              <a:t>move_cursor</a:t>
+            </a:r>
+            <a:endParaRPr lang="en-US" dirty="0"/>
+          </a:p>
+        </p:txBody>
+      </p:sp>
+      <p:cxnSp>
+        <p:nvCxnSpPr>
+          <p:cNvPr id="99" name="Straight Arrow Connector 98"/>
+          <p:cNvCxnSpPr>
+            <a:stCxn id="97" idx="0"/>
+          </p:cNvCxnSpPr>
+          <p:nvPr/>
+        </p:nvCxnSpPr>
+        <p:spPr>
+          <a:xfrm flipV="1">
+            <a:off x="5879511" y="2894006"/>
+            <a:ext cx="0" cy="769292"/>
+          </a:xfrm>
+          <a:prstGeom prst="straightConnector1">
+            <a:avLst/>
+          </a:prstGeom>
+          <a:ln>
+            <a:tailEnd type="arrow"/>
+          </a:ln>
+        </p:spPr>
+        <p:style>
+          <a:lnRef idx="2">
+            <a:schemeClr val="accent1"/>
+          </a:lnRef>
+          <a:fillRef idx="0">
+            <a:schemeClr val="accent1"/>
+          </a:fillRef>
+          <a:effectRef idx="1">
+            <a:schemeClr val="accent1"/>
+          </a:effectRef>
+          <a:fontRef idx="minor">
+            <a:schemeClr val="tx1"/>
+          </a:fontRef>
+        </p:style>
+      </p:cxnSp>
+      <p:sp>
+        <p:nvSpPr>
+          <p:cNvPr id="100" name="TextBox 99"/>
           <p:cNvSpPr txBox="1"/>
           <p:nvPr/>
         </p:nvSpPr>
         <p:spPr>
           <a:xfrm>
-            <a:off x="171450" y="1663700"/>
-            <a:ext cx="2095500" cy="1477328"/>
+            <a:off x="5226186" y="2894006"/>
+            <a:ext cx="1997422" cy="646331"/>
           </a:xfrm>
           <a:prstGeom prst="rect">
             <a:avLst/>
@@ -3271,13 +4429,91 @@
           <a:p>
             <a:r>
               <a:rPr lang="en-US" dirty="0" smtClean="0"/>
-              <a:t>Calibration button</a:t>
-            </a:r>
-          </a:p>
-          <a:p>
+              <a:t>manually adjusted quad. corners</a:t>
+            </a:r>
+            <a:endParaRPr lang="en-US" dirty="0"/>
+          </a:p>
+        </p:txBody>
+      </p:sp>
+      <p:sp>
+        <p:nvSpPr>
+          <p:cNvPr id="101" name="Rectangle 100"/>
+          <p:cNvSpPr/>
+          <p:nvPr/>
+        </p:nvSpPr>
+        <p:spPr>
+          <a:xfrm>
+            <a:off x="236890" y="3986890"/>
+            <a:ext cx="1826998" cy="647182"/>
+          </a:xfrm>
+          <a:prstGeom prst="rect">
+            <a:avLst/>
+          </a:prstGeom>
+        </p:spPr>
+        <p:style>
+          <a:lnRef idx="1">
+            <a:schemeClr val="accent1"/>
+          </a:lnRef>
+          <a:fillRef idx="3">
+            <a:schemeClr val="accent1"/>
+          </a:fillRef>
+          <a:effectRef idx="2">
+            <a:schemeClr val="accent1"/>
+          </a:effectRef>
+          <a:fontRef idx="minor">
+            <a:schemeClr val="lt1"/>
+          </a:fontRef>
+        </p:style>
+        <p:txBody>
+          <a:bodyPr rtlCol="0" anchor="ctr"/>
+          <a:lstStyle/>
+          <a:p>
+            <a:pPr algn="ctr"/>
             <a:r>
               <a:rPr lang="en-US" dirty="0" smtClean="0"/>
-              <a:t>(pressed when projector properly positioned for calibration)</a:t>
+              <a:t>Input frame BRAM buffer</a:t>
+            </a:r>
+            <a:endParaRPr lang="en-US" dirty="0"/>
+          </a:p>
+        </p:txBody>
+      </p:sp>
+      <p:sp>
+        <p:nvSpPr>
+          <p:cNvPr id="102" name="Rectangle 101"/>
+          <p:cNvSpPr/>
+          <p:nvPr/>
+        </p:nvSpPr>
+        <p:spPr>
+          <a:xfrm>
+            <a:off x="2506469" y="2369501"/>
+            <a:ext cx="1596108" cy="524505"/>
+          </a:xfrm>
+          <a:prstGeom prst="rect">
+            <a:avLst/>
+          </a:prstGeom>
+        </p:spPr>
+        <p:style>
+          <a:lnRef idx="1">
+            <a:schemeClr val="accent1"/>
+          </a:lnRef>
+          <a:fillRef idx="3">
+            <a:schemeClr val="accent1"/>
+          </a:fillRef>
+          <a:effectRef idx="2">
+            <a:schemeClr val="accent1"/>
+          </a:effectRef>
+          <a:fontRef idx="minor">
+            <a:schemeClr val="lt1"/>
+          </a:fontRef>
+        </p:style>
+        <p:txBody>
+          <a:bodyPr rtlCol="0" anchor="ctr"/>
+          <a:lstStyle/>
+          <a:p>
+            <a:pPr algn="ctr"/>
+            <a:r>
+              <a:rPr lang="en-US" dirty="0" err="1" smtClean="0"/>
+              <a:t>pixel_map</a:t>
             </a:r>
             <a:endParaRPr lang="en-US" dirty="0"/>
           </a:p>
@@ -3285,14 +4521,153 @@
       </p:sp>
       <p:cxnSp>
         <p:nvCxnSpPr>
-          <p:cNvPr id="15" name="Straight Connector 14"/>
-          <p:cNvCxnSpPr/>
+          <p:cNvPr id="104" name="Straight Arrow Connector 103"/>
+          <p:cNvCxnSpPr>
+            <a:stCxn id="90" idx="1"/>
+            <a:endCxn id="102" idx="3"/>
+          </p:cNvCxnSpPr>
           <p:nvPr/>
         </p:nvCxnSpPr>
         <p:spPr>
-          <a:xfrm>
-            <a:off x="2292350" y="1549400"/>
-            <a:ext cx="0" cy="1968500"/>
+          <a:xfrm flipH="1">
+            <a:off x="4102577" y="2631754"/>
+            <a:ext cx="1141154" cy="0"/>
+          </a:xfrm>
+          <a:prstGeom prst="straightConnector1">
+            <a:avLst/>
+          </a:prstGeom>
+          <a:ln>
+            <a:tailEnd type="arrow"/>
+          </a:ln>
+        </p:spPr>
+        <p:style>
+          <a:lnRef idx="2">
+            <a:schemeClr val="accent1"/>
+          </a:lnRef>
+          <a:fillRef idx="0">
+            <a:schemeClr val="accent1"/>
+          </a:fillRef>
+          <a:effectRef idx="1">
+            <a:schemeClr val="accent1"/>
+          </a:effectRef>
+          <a:fontRef idx="minor">
+            <a:schemeClr val="tx1"/>
+          </a:fontRef>
+        </p:style>
+      </p:cxnSp>
+      <p:sp>
+        <p:nvSpPr>
+          <p:cNvPr id="110" name="TextBox 109"/>
+          <p:cNvSpPr txBox="1"/>
+          <p:nvPr/>
+        </p:nvSpPr>
+        <p:spPr>
+          <a:xfrm>
+            <a:off x="4102577" y="2272665"/>
+            <a:ext cx="1266376" cy="646331"/>
+          </a:xfrm>
+          <a:prstGeom prst="rect">
+            <a:avLst/>
+          </a:prstGeom>
+          <a:noFill/>
+        </p:spPr>
+        <p:txBody>
+          <a:bodyPr wrap="square" rtlCol="0">
+            <a:spAutoFit/>
+          </a:bodyPr>
+          <a:lstStyle/>
+          <a:p>
+            <a:r>
+              <a:rPr lang="en-US" dirty="0" smtClean="0"/>
+              <a:t>transform</a:t>
+            </a:r>
+          </a:p>
+          <a:p>
+            <a:r>
+              <a:rPr lang="en-US" dirty="0" err="1" smtClean="0"/>
+              <a:t>params</a:t>
+            </a:r>
+            <a:endParaRPr lang="en-US" dirty="0"/>
+          </a:p>
+        </p:txBody>
+      </p:sp>
+      <p:cxnSp>
+        <p:nvCxnSpPr>
+          <p:cNvPr id="112" name="Straight Arrow Connector 111"/>
+          <p:cNvCxnSpPr>
+            <a:stCxn id="92" idx="2"/>
+          </p:cNvCxnSpPr>
+          <p:nvPr/>
+        </p:nvCxnSpPr>
+        <p:spPr>
+          <a:xfrm>
+            <a:off x="1062390" y="3469949"/>
+            <a:ext cx="0" cy="516941"/>
+          </a:xfrm>
+          <a:prstGeom prst="straightConnector1">
+            <a:avLst/>
+          </a:prstGeom>
+          <a:ln>
+            <a:tailEnd type="arrow"/>
+          </a:ln>
+        </p:spPr>
+        <p:style>
+          <a:lnRef idx="2">
+            <a:schemeClr val="accent1"/>
+          </a:lnRef>
+          <a:fillRef idx="0">
+            <a:schemeClr val="accent1"/>
+          </a:fillRef>
+          <a:effectRef idx="1">
+            <a:schemeClr val="accent1"/>
+          </a:effectRef>
+          <a:fontRef idx="minor">
+            <a:schemeClr val="tx1"/>
+          </a:fontRef>
+        </p:style>
+      </p:cxnSp>
+      <p:sp>
+        <p:nvSpPr>
+          <p:cNvPr id="114" name="TextBox 113"/>
+          <p:cNvSpPr txBox="1"/>
+          <p:nvPr/>
+        </p:nvSpPr>
+        <p:spPr>
+          <a:xfrm>
+            <a:off x="556743" y="3512507"/>
+            <a:ext cx="1331147" cy="369332"/>
+          </a:xfrm>
+          <a:prstGeom prst="rect">
+            <a:avLst/>
+          </a:prstGeom>
+          <a:noFill/>
+        </p:spPr>
+        <p:txBody>
+          <a:bodyPr wrap="square" rtlCol="0">
+            <a:spAutoFit/>
+          </a:bodyPr>
+          <a:lstStyle/>
+          <a:p>
+            <a:r>
+              <a:rPr lang="en-US" dirty="0" smtClean="0"/>
+              <a:t>pixel data</a:t>
+            </a:r>
+            <a:endParaRPr lang="en-US" dirty="0"/>
+          </a:p>
+        </p:txBody>
+      </p:sp>
+      <p:cxnSp>
+        <p:nvCxnSpPr>
+          <p:cNvPr id="116" name="Straight Connector 115"/>
+          <p:cNvCxnSpPr>
+            <a:stCxn id="101" idx="3"/>
+          </p:cNvCxnSpPr>
+          <p:nvPr/>
+        </p:nvCxnSpPr>
+        <p:spPr>
+          <a:xfrm>
+            <a:off x="2063888" y="4310481"/>
+            <a:ext cx="586193" cy="0"/>
           </a:xfrm>
           <a:prstGeom prst="line">
             <a:avLst/>
@@ -3315,14 +4690,14 @@
       </p:cxnSp>
       <p:cxnSp>
         <p:nvCxnSpPr>
-          <p:cNvPr id="19" name="Straight Arrow Connector 18"/>
+          <p:cNvPr id="118" name="Straight Arrow Connector 117"/>
           <p:cNvCxnSpPr/>
           <p:nvPr/>
         </p:nvCxnSpPr>
         <p:spPr>
-          <a:xfrm>
-            <a:off x="2292350" y="3517900"/>
-            <a:ext cx="336550" cy="0"/>
+          <a:xfrm flipV="1">
+            <a:off x="2650081" y="2918996"/>
+            <a:ext cx="0" cy="1391485"/>
           </a:xfrm>
           <a:prstGeom prst="straightConnector1">
             <a:avLst/>
@@ -3348,14 +4723,335 @@
       </p:cxnSp>
       <p:sp>
         <p:nvSpPr>
-          <p:cNvPr id="20" name="Rectangle 19"/>
+          <p:cNvPr id="119" name="TextBox 118"/>
+          <p:cNvSpPr txBox="1"/>
+          <p:nvPr/>
+        </p:nvSpPr>
+        <p:spPr>
+          <a:xfrm>
+            <a:off x="1984507" y="3293966"/>
+            <a:ext cx="1331147" cy="369332"/>
+          </a:xfrm>
+          <a:prstGeom prst="rect">
+            <a:avLst/>
+          </a:prstGeom>
+          <a:noFill/>
+        </p:spPr>
+        <p:txBody>
+          <a:bodyPr wrap="square" rtlCol="0">
+            <a:spAutoFit/>
+          </a:bodyPr>
+          <a:lstStyle/>
+          <a:p>
+            <a:r>
+              <a:rPr lang="en-US" dirty="0" smtClean="0"/>
+              <a:t>pixel data</a:t>
+            </a:r>
+            <a:endParaRPr lang="en-US" dirty="0"/>
+          </a:p>
+        </p:txBody>
+      </p:sp>
+      <p:cxnSp>
+        <p:nvCxnSpPr>
+          <p:cNvPr id="121" name="Straight Arrow Connector 120"/>
+          <p:cNvCxnSpPr/>
+          <p:nvPr/>
+        </p:nvCxnSpPr>
+        <p:spPr>
+          <a:xfrm>
+            <a:off x="3480521" y="2894006"/>
+            <a:ext cx="0" cy="1667226"/>
+          </a:xfrm>
+          <a:prstGeom prst="straightConnector1">
+            <a:avLst/>
+          </a:prstGeom>
+          <a:ln>
+            <a:tailEnd type="arrow"/>
+          </a:ln>
+        </p:spPr>
+        <p:style>
+          <a:lnRef idx="2">
+            <a:schemeClr val="accent1"/>
+          </a:lnRef>
+          <a:fillRef idx="0">
+            <a:schemeClr val="accent1"/>
+          </a:fillRef>
+          <a:effectRef idx="1">
+            <a:schemeClr val="accent1"/>
+          </a:effectRef>
+          <a:fontRef idx="minor">
+            <a:schemeClr val="tx1"/>
+          </a:fontRef>
+        </p:style>
+      </p:cxnSp>
+      <p:sp>
+        <p:nvSpPr>
+          <p:cNvPr id="122" name="Rectangle 121"/>
           <p:cNvSpPr/>
           <p:nvPr/>
         </p:nvSpPr>
         <p:spPr>
           <a:xfrm>
-            <a:off x="2628900" y="2946400"/>
-            <a:ext cx="1727200" cy="1460500"/>
+            <a:off x="2650081" y="4555552"/>
+            <a:ext cx="1563181" cy="823817"/>
+          </a:xfrm>
+          <a:prstGeom prst="rect">
+            <a:avLst/>
+          </a:prstGeom>
+        </p:spPr>
+        <p:style>
+          <a:lnRef idx="1">
+            <a:schemeClr val="accent1"/>
+          </a:lnRef>
+          <a:fillRef idx="3">
+            <a:schemeClr val="accent1"/>
+          </a:fillRef>
+          <a:effectRef idx="2">
+            <a:schemeClr val="accent1"/>
+          </a:effectRef>
+          <a:fontRef idx="minor">
+            <a:schemeClr val="lt1"/>
+          </a:fontRef>
+        </p:style>
+        <p:txBody>
+          <a:bodyPr rtlCol="0" anchor="ctr"/>
+          <a:lstStyle/>
+          <a:p>
+            <a:pPr algn="ctr"/>
+            <a:r>
+              <a:rPr lang="en-US" dirty="0" smtClean="0"/>
+              <a:t>Output frame BRAM buffer</a:t>
+            </a:r>
+            <a:endParaRPr lang="en-US" dirty="0"/>
+          </a:p>
+        </p:txBody>
+      </p:sp>
+      <p:cxnSp>
+        <p:nvCxnSpPr>
+          <p:cNvPr id="124" name="Straight Arrow Connector 123"/>
+          <p:cNvCxnSpPr/>
+          <p:nvPr/>
+        </p:nvCxnSpPr>
+        <p:spPr>
+          <a:xfrm>
+            <a:off x="556743" y="6190974"/>
+            <a:ext cx="1949726" cy="0"/>
+          </a:xfrm>
+          <a:prstGeom prst="straightConnector1">
+            <a:avLst/>
+          </a:prstGeom>
+          <a:ln>
+            <a:tailEnd type="arrow"/>
+          </a:ln>
+        </p:spPr>
+        <p:style>
+          <a:lnRef idx="2">
+            <a:schemeClr val="accent1"/>
+          </a:lnRef>
+          <a:fillRef idx="0">
+            <a:schemeClr val="accent1"/>
+          </a:fillRef>
+          <a:effectRef idx="1">
+            <a:schemeClr val="accent1"/>
+          </a:effectRef>
+          <a:fontRef idx="minor">
+            <a:schemeClr val="tx1"/>
+          </a:fontRef>
+        </p:style>
+      </p:cxnSp>
+      <p:sp>
+        <p:nvSpPr>
+          <p:cNvPr id="125" name="TextBox 124"/>
+          <p:cNvSpPr txBox="1"/>
+          <p:nvPr/>
+        </p:nvSpPr>
+        <p:spPr>
+          <a:xfrm>
+            <a:off x="130084" y="6211669"/>
+            <a:ext cx="2376385" cy="646331"/>
+          </a:xfrm>
+          <a:prstGeom prst="rect">
+            <a:avLst/>
+          </a:prstGeom>
+          <a:noFill/>
+        </p:spPr>
+        <p:txBody>
+          <a:bodyPr wrap="square" rtlCol="0">
+            <a:spAutoFit/>
+          </a:bodyPr>
+          <a:lstStyle/>
+          <a:p>
+            <a:r>
+              <a:rPr lang="en-US" dirty="0" smtClean="0"/>
+              <a:t>VGA signals (</a:t>
+            </a:r>
+            <a:r>
+              <a:rPr lang="en-US" dirty="0" err="1" smtClean="0"/>
+              <a:t>hcount</a:t>
+            </a:r>
+            <a:r>
+              <a:rPr lang="en-US" dirty="0" smtClean="0"/>
+              <a:t>, </a:t>
+            </a:r>
+            <a:r>
+              <a:rPr lang="en-US" dirty="0" err="1" smtClean="0"/>
+              <a:t>vcount</a:t>
+            </a:r>
+            <a:r>
+              <a:rPr lang="en-US" dirty="0" smtClean="0"/>
+              <a:t>, etc.)</a:t>
+            </a:r>
+            <a:endParaRPr lang="en-US" dirty="0"/>
+          </a:p>
+        </p:txBody>
+      </p:sp>
+      <p:sp>
+        <p:nvSpPr>
+          <p:cNvPr id="126" name="TextBox 125"/>
+          <p:cNvSpPr txBox="1"/>
+          <p:nvPr/>
+        </p:nvSpPr>
+        <p:spPr>
+          <a:xfrm>
+            <a:off x="3024953" y="3355671"/>
+            <a:ext cx="1331147" cy="369332"/>
+          </a:xfrm>
+          <a:prstGeom prst="rect">
+            <a:avLst/>
+          </a:prstGeom>
+          <a:noFill/>
+        </p:spPr>
+        <p:txBody>
+          <a:bodyPr wrap="square" rtlCol="0">
+            <a:spAutoFit/>
+          </a:bodyPr>
+          <a:lstStyle/>
+          <a:p>
+            <a:r>
+              <a:rPr lang="en-US" dirty="0" smtClean="0"/>
+              <a:t>pixel data</a:t>
+            </a:r>
+            <a:endParaRPr lang="en-US" dirty="0"/>
+          </a:p>
+        </p:txBody>
+      </p:sp>
+      <p:sp>
+        <p:nvSpPr>
+          <p:cNvPr id="127" name="Rectangle 126"/>
+          <p:cNvSpPr/>
+          <p:nvPr/>
+        </p:nvSpPr>
+        <p:spPr>
+          <a:xfrm>
+            <a:off x="2506469" y="6032231"/>
+            <a:ext cx="1596108" cy="458338"/>
+          </a:xfrm>
+          <a:prstGeom prst="rect">
+            <a:avLst/>
+          </a:prstGeom>
+        </p:spPr>
+        <p:style>
+          <a:lnRef idx="1">
+            <a:schemeClr val="accent1"/>
+          </a:lnRef>
+          <a:fillRef idx="3">
+            <a:schemeClr val="accent1"/>
+          </a:fillRef>
+          <a:effectRef idx="2">
+            <a:schemeClr val="accent1"/>
+          </a:effectRef>
+          <a:fontRef idx="minor">
+            <a:schemeClr val="lt1"/>
+          </a:fontRef>
+        </p:style>
+        <p:txBody>
+          <a:bodyPr rtlCol="0" anchor="ctr"/>
+          <a:lstStyle/>
+          <a:p>
+            <a:pPr algn="ctr"/>
+            <a:r>
+              <a:rPr lang="en-US" dirty="0" err="1" smtClean="0"/>
+              <a:t>addr_map</a:t>
+            </a:r>
+            <a:endParaRPr lang="en-US" dirty="0"/>
+          </a:p>
+        </p:txBody>
+      </p:sp>
+      <p:cxnSp>
+        <p:nvCxnSpPr>
+          <p:cNvPr id="129" name="Straight Arrow Connector 128"/>
+          <p:cNvCxnSpPr>
+            <a:stCxn id="122" idx="2"/>
+          </p:cNvCxnSpPr>
+          <p:nvPr/>
+        </p:nvCxnSpPr>
+        <p:spPr>
+          <a:xfrm>
+            <a:off x="3431672" y="5379369"/>
+            <a:ext cx="0" cy="652862"/>
+          </a:xfrm>
+          <a:prstGeom prst="straightConnector1">
+            <a:avLst/>
+          </a:prstGeom>
+          <a:ln>
+            <a:tailEnd type="arrow"/>
+          </a:ln>
+        </p:spPr>
+        <p:style>
+          <a:lnRef idx="2">
+            <a:schemeClr val="accent1"/>
+          </a:lnRef>
+          <a:fillRef idx="0">
+            <a:schemeClr val="accent1"/>
+          </a:fillRef>
+          <a:effectRef idx="1">
+            <a:schemeClr val="accent1"/>
+          </a:effectRef>
+          <a:fontRef idx="minor">
+            <a:schemeClr val="tx1"/>
+          </a:fontRef>
+        </p:style>
+      </p:cxnSp>
+      <p:sp>
+        <p:nvSpPr>
+          <p:cNvPr id="132" name="TextBox 131"/>
+          <p:cNvSpPr txBox="1"/>
+          <p:nvPr/>
+        </p:nvSpPr>
+        <p:spPr>
+          <a:xfrm>
+            <a:off x="2882115" y="5487427"/>
+            <a:ext cx="1331147" cy="369332"/>
+          </a:xfrm>
+          <a:prstGeom prst="rect">
+            <a:avLst/>
+          </a:prstGeom>
+          <a:noFill/>
+        </p:spPr>
+        <p:txBody>
+          <a:bodyPr wrap="square" rtlCol="0">
+            <a:spAutoFit/>
+          </a:bodyPr>
+          <a:lstStyle/>
+          <a:p>
+            <a:r>
+              <a:rPr lang="en-US" dirty="0" smtClean="0"/>
+              <a:t>pixel data</a:t>
+            </a:r>
+            <a:endParaRPr lang="en-US" dirty="0"/>
+          </a:p>
+        </p:txBody>
+      </p:sp>
+      <p:sp>
+        <p:nvSpPr>
+          <p:cNvPr id="133" name="Rectangle 132"/>
+          <p:cNvSpPr/>
+          <p:nvPr/>
+        </p:nvSpPr>
+        <p:spPr>
+          <a:xfrm>
+            <a:off x="4827654" y="5916652"/>
+            <a:ext cx="1651000" cy="653226"/>
           </a:xfrm>
           <a:prstGeom prst="rect">
             <a:avLst/>
@@ -3382,7 +5078,7 @@
             <a:pPr algn="ctr"/>
             <a:r>
               <a:rPr lang="en-US" dirty="0" smtClean="0"/>
-              <a:t>Audio for calibration help and tilt angle announcement (FSM)</a:t>
+              <a:t>projector</a:t>
             </a:r>
             <a:endParaRPr lang="en-US" dirty="0"/>
           </a:p>
@@ -3390,14 +5086,16 @@
       </p:sp>
       <p:cxnSp>
         <p:nvCxnSpPr>
-          <p:cNvPr id="22" name="Straight Arrow Connector 21"/>
-          <p:cNvCxnSpPr/>
+          <p:cNvPr id="135" name="Straight Arrow Connector 134"/>
+          <p:cNvCxnSpPr>
+            <a:stCxn id="127" idx="3"/>
+          </p:cNvCxnSpPr>
           <p:nvPr/>
         </p:nvCxnSpPr>
         <p:spPr>
           <a:xfrm>
-            <a:off x="533400" y="4165600"/>
-            <a:ext cx="2095500" cy="0"/>
+            <a:off x="4102577" y="6261400"/>
+            <a:ext cx="725077" cy="0"/>
           </a:xfrm>
           <a:prstGeom prst="straightConnector1">
             <a:avLst/>
@@ -3421,640 +5119,6 @@
           </a:fontRef>
         </p:style>
       </p:cxnSp>
-      <p:sp>
-        <p:nvSpPr>
-          <p:cNvPr id="23" name="TextBox 22"/>
-          <p:cNvSpPr txBox="1"/>
-          <p:nvPr/>
-        </p:nvSpPr>
-        <p:spPr>
-          <a:xfrm>
-            <a:off x="171450" y="4292600"/>
-            <a:ext cx="1733550" cy="923330"/>
-          </a:xfrm>
-          <a:prstGeom prst="rect">
-            <a:avLst/>
-          </a:prstGeom>
-          <a:noFill/>
-        </p:spPr>
-        <p:txBody>
-          <a:bodyPr wrap="square" rtlCol="0">
-            <a:spAutoFit/>
-          </a:bodyPr>
-          <a:lstStyle/>
-          <a:p>
-            <a:r>
-              <a:rPr lang="en-US" dirty="0" smtClean="0"/>
-              <a:t>Button to start calibration help audio </a:t>
-            </a:r>
-            <a:endParaRPr lang="en-US" dirty="0"/>
-          </a:p>
-        </p:txBody>
-      </p:sp>
-      <p:sp>
-        <p:nvSpPr>
-          <p:cNvPr id="24" name="Rectangle 23"/>
-          <p:cNvSpPr/>
-          <p:nvPr/>
-        </p:nvSpPr>
-        <p:spPr>
-          <a:xfrm>
-            <a:off x="5067300" y="533400"/>
-            <a:ext cx="1841500" cy="850900"/>
-          </a:xfrm>
-          <a:prstGeom prst="rect">
-            <a:avLst/>
-          </a:prstGeom>
-        </p:spPr>
-        <p:style>
-          <a:lnRef idx="1">
-            <a:schemeClr val="accent5"/>
-          </a:lnRef>
-          <a:fillRef idx="2">
-            <a:schemeClr val="accent5"/>
-          </a:fillRef>
-          <a:effectRef idx="1">
-            <a:schemeClr val="accent5"/>
-          </a:effectRef>
-          <a:fontRef idx="minor">
-            <a:schemeClr val="dk1"/>
-          </a:fontRef>
-        </p:style>
-        <p:txBody>
-          <a:bodyPr rtlCol="0" anchor="ctr"/>
-          <a:lstStyle/>
-          <a:p>
-            <a:pPr algn="ctr"/>
-            <a:r>
-              <a:rPr lang="en-US" dirty="0" smtClean="0"/>
-              <a:t>Camera input (to be projected)</a:t>
-            </a:r>
-            <a:endParaRPr lang="en-US" dirty="0"/>
-          </a:p>
-        </p:txBody>
-      </p:sp>
-      <p:cxnSp>
-        <p:nvCxnSpPr>
-          <p:cNvPr id="26" name="Straight Arrow Connector 25"/>
-          <p:cNvCxnSpPr>
-            <a:stCxn id="24" idx="2"/>
-            <a:endCxn id="27" idx="0"/>
-          </p:cNvCxnSpPr>
-          <p:nvPr/>
-        </p:nvCxnSpPr>
-        <p:spPr>
-          <a:xfrm>
-            <a:off x="5988050" y="1384300"/>
-            <a:ext cx="0" cy="651828"/>
-          </a:xfrm>
-          <a:prstGeom prst="straightConnector1">
-            <a:avLst/>
-          </a:prstGeom>
-          <a:ln>
-            <a:tailEnd type="arrow"/>
-          </a:ln>
-        </p:spPr>
-        <p:style>
-          <a:lnRef idx="2">
-            <a:schemeClr val="accent1"/>
-          </a:lnRef>
-          <a:fillRef idx="0">
-            <a:schemeClr val="accent1"/>
-          </a:fillRef>
-          <a:effectRef idx="1">
-            <a:schemeClr val="accent1"/>
-          </a:effectRef>
-          <a:fontRef idx="minor">
-            <a:schemeClr val="tx1"/>
-          </a:fontRef>
-        </p:style>
-      </p:cxnSp>
-      <p:sp>
-        <p:nvSpPr>
-          <p:cNvPr id="27" name="Rectangle 26"/>
-          <p:cNvSpPr/>
-          <p:nvPr/>
-        </p:nvSpPr>
-        <p:spPr>
-          <a:xfrm>
-            <a:off x="5156200" y="2036128"/>
-            <a:ext cx="1663700" cy="1168400"/>
-          </a:xfrm>
-          <a:prstGeom prst="rect">
-            <a:avLst/>
-          </a:prstGeom>
-        </p:spPr>
-        <p:style>
-          <a:lnRef idx="1">
-            <a:schemeClr val="accent5"/>
-          </a:lnRef>
-          <a:fillRef idx="2">
-            <a:schemeClr val="accent5"/>
-          </a:fillRef>
-          <a:effectRef idx="1">
-            <a:schemeClr val="accent5"/>
-          </a:effectRef>
-          <a:fontRef idx="minor">
-            <a:schemeClr val="dk1"/>
-          </a:fontRef>
-        </p:style>
-        <p:txBody>
-          <a:bodyPr rtlCol="0" anchor="ctr"/>
-          <a:lstStyle/>
-          <a:p>
-            <a:pPr algn="ctr"/>
-            <a:r>
-              <a:rPr lang="en-US" dirty="0" smtClean="0"/>
-              <a:t>Frame correction system</a:t>
-            </a:r>
-            <a:endParaRPr lang="en-US" dirty="0"/>
-          </a:p>
-        </p:txBody>
-      </p:sp>
-      <p:sp>
-        <p:nvSpPr>
-          <p:cNvPr id="32" name="Rectangle 31"/>
-          <p:cNvSpPr/>
-          <p:nvPr/>
-        </p:nvSpPr>
-        <p:spPr>
-          <a:xfrm>
-            <a:off x="7620000" y="2036128"/>
-            <a:ext cx="1371600" cy="1168400"/>
-          </a:xfrm>
-          <a:prstGeom prst="rect">
-            <a:avLst/>
-          </a:prstGeom>
-        </p:spPr>
-        <p:style>
-          <a:lnRef idx="1">
-            <a:schemeClr val="accent5"/>
-          </a:lnRef>
-          <a:fillRef idx="2">
-            <a:schemeClr val="accent5"/>
-          </a:fillRef>
-          <a:effectRef idx="1">
-            <a:schemeClr val="accent5"/>
-          </a:effectRef>
-          <a:fontRef idx="minor">
-            <a:schemeClr val="dk1"/>
-          </a:fontRef>
-        </p:style>
-        <p:txBody>
-          <a:bodyPr rtlCol="0" anchor="ctr"/>
-          <a:lstStyle/>
-          <a:p>
-            <a:pPr algn="ctr"/>
-            <a:r>
-              <a:rPr lang="en-US" dirty="0" smtClean="0"/>
-              <a:t>ZBT scratch space</a:t>
-            </a:r>
-            <a:endParaRPr lang="en-US" dirty="0"/>
-          </a:p>
-        </p:txBody>
-      </p:sp>
-      <p:cxnSp>
-        <p:nvCxnSpPr>
-          <p:cNvPr id="34" name="Straight Arrow Connector 33"/>
-          <p:cNvCxnSpPr/>
-          <p:nvPr/>
-        </p:nvCxnSpPr>
-        <p:spPr>
-          <a:xfrm>
-            <a:off x="6819900" y="2404428"/>
-            <a:ext cx="800100" cy="0"/>
-          </a:xfrm>
-          <a:prstGeom prst="straightConnector1">
-            <a:avLst/>
-          </a:prstGeom>
-          <a:ln>
-            <a:tailEnd type="arrow"/>
-          </a:ln>
-        </p:spPr>
-        <p:style>
-          <a:lnRef idx="2">
-            <a:schemeClr val="accent1"/>
-          </a:lnRef>
-          <a:fillRef idx="0">
-            <a:schemeClr val="accent1"/>
-          </a:fillRef>
-          <a:effectRef idx="1">
-            <a:schemeClr val="accent1"/>
-          </a:effectRef>
-          <a:fontRef idx="minor">
-            <a:schemeClr val="tx1"/>
-          </a:fontRef>
-        </p:style>
-      </p:cxnSp>
-      <p:cxnSp>
-        <p:nvCxnSpPr>
-          <p:cNvPr id="36" name="Straight Arrow Connector 35"/>
-          <p:cNvCxnSpPr/>
-          <p:nvPr/>
-        </p:nvCxnSpPr>
-        <p:spPr>
-          <a:xfrm flipH="1">
-            <a:off x="6819900" y="2946400"/>
-            <a:ext cx="800100" cy="0"/>
-          </a:xfrm>
-          <a:prstGeom prst="straightConnector1">
-            <a:avLst/>
-          </a:prstGeom>
-          <a:ln>
-            <a:tailEnd type="arrow"/>
-          </a:ln>
-        </p:spPr>
-        <p:style>
-          <a:lnRef idx="2">
-            <a:schemeClr val="accent1"/>
-          </a:lnRef>
-          <a:fillRef idx="0">
-            <a:schemeClr val="accent1"/>
-          </a:fillRef>
-          <a:effectRef idx="1">
-            <a:schemeClr val="accent1"/>
-          </a:effectRef>
-          <a:fontRef idx="minor">
-            <a:schemeClr val="tx1"/>
-          </a:fontRef>
-        </p:style>
-      </p:cxnSp>
-      <p:cxnSp>
-        <p:nvCxnSpPr>
-          <p:cNvPr id="40" name="Straight Arrow Connector 39"/>
-          <p:cNvCxnSpPr>
-            <a:stCxn id="8" idx="2"/>
-          </p:cNvCxnSpPr>
-          <p:nvPr/>
-        </p:nvCxnSpPr>
-        <p:spPr>
-          <a:xfrm>
-            <a:off x="3657600" y="1663700"/>
-            <a:ext cx="0" cy="1282700"/>
-          </a:xfrm>
-          <a:prstGeom prst="straightConnector1">
-            <a:avLst/>
-          </a:prstGeom>
-          <a:ln>
-            <a:tailEnd type="arrow"/>
-          </a:ln>
-        </p:spPr>
-        <p:style>
-          <a:lnRef idx="2">
-            <a:schemeClr val="accent1"/>
-          </a:lnRef>
-          <a:fillRef idx="0">
-            <a:schemeClr val="accent1"/>
-          </a:fillRef>
-          <a:effectRef idx="1">
-            <a:schemeClr val="accent1"/>
-          </a:effectRef>
-          <a:fontRef idx="minor">
-            <a:schemeClr val="tx1"/>
-          </a:fontRef>
-        </p:style>
-      </p:cxnSp>
-      <p:cxnSp>
-        <p:nvCxnSpPr>
-          <p:cNvPr id="42" name="Straight Arrow Connector 41"/>
-          <p:cNvCxnSpPr/>
-          <p:nvPr/>
-        </p:nvCxnSpPr>
-        <p:spPr>
-          <a:xfrm>
-            <a:off x="3657600" y="2404428"/>
-            <a:ext cx="1498600" cy="0"/>
-          </a:xfrm>
-          <a:prstGeom prst="straightConnector1">
-            <a:avLst/>
-          </a:prstGeom>
-          <a:ln>
-            <a:tailEnd type="arrow"/>
-          </a:ln>
-        </p:spPr>
-        <p:style>
-          <a:lnRef idx="2">
-            <a:schemeClr val="accent1"/>
-          </a:lnRef>
-          <a:fillRef idx="0">
-            <a:schemeClr val="accent1"/>
-          </a:fillRef>
-          <a:effectRef idx="1">
-            <a:schemeClr val="accent1"/>
-          </a:effectRef>
-          <a:fontRef idx="minor">
-            <a:schemeClr val="tx1"/>
-          </a:fontRef>
-        </p:style>
-      </p:cxnSp>
-      <p:sp>
-        <p:nvSpPr>
-          <p:cNvPr id="43" name="TextBox 42"/>
-          <p:cNvSpPr txBox="1"/>
-          <p:nvPr/>
-        </p:nvSpPr>
-        <p:spPr>
-          <a:xfrm>
-            <a:off x="3784600" y="1758097"/>
-            <a:ext cx="882650" cy="646331"/>
-          </a:xfrm>
-          <a:prstGeom prst="rect">
-            <a:avLst/>
-          </a:prstGeom>
-          <a:noFill/>
-        </p:spPr>
-        <p:txBody>
-          <a:bodyPr wrap="square" rtlCol="0">
-            <a:spAutoFit/>
-          </a:bodyPr>
-          <a:lstStyle/>
-          <a:p>
-            <a:r>
-              <a:rPr lang="en-US" dirty="0" smtClean="0"/>
-              <a:t>Tilt angles</a:t>
-            </a:r>
-            <a:endParaRPr lang="en-US" dirty="0"/>
-          </a:p>
-        </p:txBody>
-      </p:sp>
-      <p:sp>
-        <p:nvSpPr>
-          <p:cNvPr id="44" name="Rectangle 43"/>
-          <p:cNvSpPr/>
-          <p:nvPr/>
-        </p:nvSpPr>
-        <p:spPr>
-          <a:xfrm>
-            <a:off x="5156200" y="3733800"/>
-            <a:ext cx="1663700" cy="774700"/>
-          </a:xfrm>
-          <a:prstGeom prst="rect">
-            <a:avLst/>
-          </a:prstGeom>
-        </p:spPr>
-        <p:style>
-          <a:lnRef idx="1">
-            <a:schemeClr val="accent5"/>
-          </a:lnRef>
-          <a:fillRef idx="2">
-            <a:schemeClr val="accent5"/>
-          </a:fillRef>
-          <a:effectRef idx="1">
-            <a:schemeClr val="accent5"/>
-          </a:effectRef>
-          <a:fontRef idx="minor">
-            <a:schemeClr val="dk1"/>
-          </a:fontRef>
-        </p:style>
-        <p:txBody>
-          <a:bodyPr rtlCol="0" anchor="ctr"/>
-          <a:lstStyle/>
-          <a:p>
-            <a:pPr algn="ctr"/>
-            <a:r>
-              <a:rPr lang="en-US" dirty="0" smtClean="0"/>
-              <a:t>ZBT display buffer</a:t>
-            </a:r>
-            <a:endParaRPr lang="en-US" dirty="0"/>
-          </a:p>
-        </p:txBody>
-      </p:sp>
-      <p:cxnSp>
-        <p:nvCxnSpPr>
-          <p:cNvPr id="46" name="Straight Arrow Connector 45"/>
-          <p:cNvCxnSpPr>
-            <a:stCxn id="27" idx="2"/>
-            <a:endCxn id="44" idx="0"/>
-          </p:cNvCxnSpPr>
-          <p:nvPr/>
-        </p:nvCxnSpPr>
-        <p:spPr>
-          <a:xfrm>
-            <a:off x="5988050" y="3204528"/>
-            <a:ext cx="0" cy="529272"/>
-          </a:xfrm>
-          <a:prstGeom prst="straightConnector1">
-            <a:avLst/>
-          </a:prstGeom>
-          <a:ln>
-            <a:tailEnd type="arrow"/>
-          </a:ln>
-        </p:spPr>
-        <p:style>
-          <a:lnRef idx="2">
-            <a:schemeClr val="accent1"/>
-          </a:lnRef>
-          <a:fillRef idx="0">
-            <a:schemeClr val="accent1"/>
-          </a:fillRef>
-          <a:effectRef idx="1">
-            <a:schemeClr val="accent1"/>
-          </a:effectRef>
-          <a:fontRef idx="minor">
-            <a:schemeClr val="tx1"/>
-          </a:fontRef>
-        </p:style>
-      </p:cxnSp>
-      <p:cxnSp>
-        <p:nvCxnSpPr>
-          <p:cNvPr id="48" name="Straight Arrow Connector 47"/>
-          <p:cNvCxnSpPr>
-            <a:stCxn id="44" idx="2"/>
-          </p:cNvCxnSpPr>
-          <p:nvPr/>
-        </p:nvCxnSpPr>
-        <p:spPr>
-          <a:xfrm>
-            <a:off x="5988050" y="4508500"/>
-            <a:ext cx="0" cy="495300"/>
-          </a:xfrm>
-          <a:prstGeom prst="straightConnector1">
-            <a:avLst/>
-          </a:prstGeom>
-          <a:ln>
-            <a:tailEnd type="arrow"/>
-          </a:ln>
-        </p:spPr>
-        <p:style>
-          <a:lnRef idx="2">
-            <a:schemeClr val="accent1"/>
-          </a:lnRef>
-          <a:fillRef idx="0">
-            <a:schemeClr val="accent1"/>
-          </a:fillRef>
-          <a:effectRef idx="1">
-            <a:schemeClr val="accent1"/>
-          </a:effectRef>
-          <a:fontRef idx="minor">
-            <a:schemeClr val="tx1"/>
-          </a:fontRef>
-        </p:style>
-      </p:cxnSp>
-      <p:sp>
-        <p:nvSpPr>
-          <p:cNvPr id="49" name="Rectangle 48"/>
-          <p:cNvSpPr/>
-          <p:nvPr/>
-        </p:nvSpPr>
-        <p:spPr>
-          <a:xfrm>
-            <a:off x="5156200" y="5003800"/>
-            <a:ext cx="1663700" cy="673100"/>
-          </a:xfrm>
-          <a:prstGeom prst="rect">
-            <a:avLst/>
-          </a:prstGeom>
-        </p:spPr>
-        <p:style>
-          <a:lnRef idx="1">
-            <a:schemeClr val="accent5"/>
-          </a:lnRef>
-          <a:fillRef idx="2">
-            <a:schemeClr val="accent5"/>
-          </a:fillRef>
-          <a:effectRef idx="1">
-            <a:schemeClr val="accent5"/>
-          </a:effectRef>
-          <a:fontRef idx="minor">
-            <a:schemeClr val="dk1"/>
-          </a:fontRef>
-        </p:style>
-        <p:txBody>
-          <a:bodyPr rtlCol="0" anchor="ctr"/>
-          <a:lstStyle/>
-          <a:p>
-            <a:pPr algn="ctr"/>
-            <a:r>
-              <a:rPr lang="en-US" dirty="0" smtClean="0"/>
-              <a:t>VGA output (projector)</a:t>
-            </a:r>
-            <a:endParaRPr lang="en-US" dirty="0"/>
-          </a:p>
-        </p:txBody>
-      </p:sp>
-      <p:cxnSp>
-        <p:nvCxnSpPr>
-          <p:cNvPr id="6" name="Straight Connector 5"/>
-          <p:cNvCxnSpPr/>
-          <p:nvPr/>
-        </p:nvCxnSpPr>
-        <p:spPr>
-          <a:xfrm flipV="1">
-            <a:off x="355600" y="5546130"/>
-            <a:ext cx="4311650" cy="25400"/>
-          </a:xfrm>
-          <a:prstGeom prst="line">
-            <a:avLst/>
-          </a:prstGeom>
-        </p:spPr>
-        <p:style>
-          <a:lnRef idx="2">
-            <a:schemeClr val="accent1"/>
-          </a:lnRef>
-          <a:fillRef idx="0">
-            <a:schemeClr val="accent1"/>
-          </a:fillRef>
-          <a:effectRef idx="1">
-            <a:schemeClr val="accent1"/>
-          </a:effectRef>
-          <a:fontRef idx="minor">
-            <a:schemeClr val="tx1"/>
-          </a:fontRef>
-        </p:style>
-      </p:cxnSp>
-      <p:cxnSp>
-        <p:nvCxnSpPr>
-          <p:cNvPr id="12" name="Straight Connector 11"/>
-          <p:cNvCxnSpPr/>
-          <p:nvPr/>
-        </p:nvCxnSpPr>
-        <p:spPr>
-          <a:xfrm flipV="1">
-            <a:off x="4667250" y="2946400"/>
-            <a:ext cx="0" cy="2599730"/>
-          </a:xfrm>
-          <a:prstGeom prst="line">
-            <a:avLst/>
-          </a:prstGeom>
-        </p:spPr>
-        <p:style>
-          <a:lnRef idx="2">
-            <a:schemeClr val="accent1"/>
-          </a:lnRef>
-          <a:fillRef idx="0">
-            <a:schemeClr val="accent1"/>
-          </a:fillRef>
-          <a:effectRef idx="1">
-            <a:schemeClr val="accent1"/>
-          </a:effectRef>
-          <a:fontRef idx="minor">
-            <a:schemeClr val="tx1"/>
-          </a:fontRef>
-        </p:style>
-      </p:cxnSp>
-      <p:cxnSp>
-        <p:nvCxnSpPr>
-          <p:cNvPr id="14" name="Straight Arrow Connector 13"/>
-          <p:cNvCxnSpPr/>
-          <p:nvPr/>
-        </p:nvCxnSpPr>
-        <p:spPr>
-          <a:xfrm>
-            <a:off x="4667250" y="2946400"/>
-            <a:ext cx="488950" cy="0"/>
-          </a:xfrm>
-          <a:prstGeom prst="straightConnector1">
-            <a:avLst/>
-          </a:prstGeom>
-          <a:ln>
-            <a:tailEnd type="arrow"/>
-          </a:ln>
-        </p:spPr>
-        <p:style>
-          <a:lnRef idx="2">
-            <a:schemeClr val="accent1"/>
-          </a:lnRef>
-          <a:fillRef idx="0">
-            <a:schemeClr val="accent1"/>
-          </a:fillRef>
-          <a:effectRef idx="1">
-            <a:schemeClr val="accent1"/>
-          </a:effectRef>
-          <a:fontRef idx="minor">
-            <a:schemeClr val="tx1"/>
-          </a:fontRef>
-        </p:style>
-      </p:cxnSp>
-      <p:sp>
-        <p:nvSpPr>
-          <p:cNvPr id="16" name="TextBox 15"/>
-          <p:cNvSpPr txBox="1"/>
-          <p:nvPr/>
-        </p:nvSpPr>
-        <p:spPr>
-          <a:xfrm>
-            <a:off x="190500" y="5680670"/>
-            <a:ext cx="2438400" cy="923330"/>
-          </a:xfrm>
-          <a:prstGeom prst="rect">
-            <a:avLst/>
-          </a:prstGeom>
-          <a:noFill/>
-        </p:spPr>
-        <p:txBody>
-          <a:bodyPr wrap="square" rtlCol="0">
-            <a:spAutoFit/>
-          </a:bodyPr>
-          <a:lstStyle/>
-          <a:p>
-            <a:r>
-              <a:rPr lang="en-US" dirty="0" smtClean="0"/>
-              <a:t>Knob for manual keystone correction (ignored if set to zero)</a:t>
-            </a:r>
-            <a:endParaRPr lang="en-US" dirty="0"/>
-          </a:p>
-        </p:txBody>
-      </p:sp>
     </p:spTree>
     <p:extLst>
       <p:ext uri="{BB962C8B-B14F-4D97-AF65-F5344CB8AC3E}">
@@ -4065,6 +5129,13 @@
   <p:clrMapOvr>
     <a:masterClrMapping/>
   </p:clrMapOvr>
+  <p:timing>
+    <p:tnLst>
+      <p:par>
+        <p:cTn xmlns:p14="http://schemas.microsoft.com/office/powerpoint/2010/main" id="1" dur="indefinite" restart="never" nodeType="tmRoot"/>
+      </p:par>
+    </p:tnLst>
+  </p:timing>
 </p:sld>
 </file>
 

</xml_diff>

<commit_message>
Fixes suggested by Ganesh
</commit_message>
<xml_diff>
--- a/doc/proj_report/img/block_diag.pptx
+++ b/doc/proj_report/img/block_diag.pptx
@@ -3767,7 +3767,7 @@
             <a:pPr algn="ctr"/>
             <a:r>
               <a:rPr lang="en-US" dirty="0" err="1" smtClean="0"/>
-              <a:t>pixels_lost</a:t>
+              <a:t>pixels_kept</a:t>
             </a:r>
             <a:endParaRPr lang="en-US" dirty="0"/>
           </a:p>
@@ -3865,16 +3865,16 @@
         </p:spPr>
         <p:style>
           <a:lnRef idx="1">
-            <a:schemeClr val="accent1"/>
+            <a:schemeClr val="accent5"/>
           </a:lnRef>
-          <a:fillRef idx="3">
-            <a:schemeClr val="accent1"/>
+          <a:fillRef idx="2">
+            <a:schemeClr val="accent5"/>
           </a:fillRef>
-          <a:effectRef idx="2">
-            <a:schemeClr val="accent1"/>
+          <a:effectRef idx="1">
+            <a:schemeClr val="accent5"/>
           </a:effectRef>
           <a:fontRef idx="minor">
-            <a:schemeClr val="lt1"/>
+            <a:schemeClr val="dk1"/>
           </a:fontRef>
         </p:style>
         <p:txBody>
@@ -4097,7 +4097,7 @@
           <a:p>
             <a:r>
               <a:rPr lang="en-US" dirty="0" smtClean="0"/>
-              <a:t>% pixels lost</a:t>
+              <a:t>% pixels kept</a:t>
             </a:r>
             <a:endParaRPr lang="en-US" dirty="0"/>
           </a:p>

</xml_diff>